<commit_message>
Added more docs Modified prompts to work for gpt-4o (earlier these were working with gpt-3.5)
</commit_message>
<xml_diff>
--- a/DocAI-Architecture-customer.pptx
+++ b/DocAI-Architecture-customer.pptx
@@ -158,6 +158,46 @@
       </pc:sldChg>
     </pc:docChg>
   </pc:docChgLst>
+  <pc:docChgLst>
+    <pc:chgData name="Tirthankar Barari (TR)" userId="e41d4ef3-c9c5-4f08-a494-4c3cb9d953aa" providerId="ADAL" clId="{079A74BE-26DC-4701-92BA-94758874B078}"/>
+    <pc:docChg chg="custSel modSld">
+      <pc:chgData name="Tirthankar Barari (TR)" userId="e41d4ef3-c9c5-4f08-a494-4c3cb9d953aa" providerId="ADAL" clId="{079A74BE-26DC-4701-92BA-94758874B078}" dt="2024-10-01T13:24:25.950" v="33" actId="1076"/>
+      <pc:docMkLst>
+        <pc:docMk/>
+      </pc:docMkLst>
+      <pc:sldChg chg="addSp delSp modSp mod">
+        <pc:chgData name="Tirthankar Barari (TR)" userId="e41d4ef3-c9c5-4f08-a494-4c3cb9d953aa" providerId="ADAL" clId="{079A74BE-26DC-4701-92BA-94758874B078}" dt="2024-10-01T13:24:25.950" v="33" actId="1076"/>
+        <pc:sldMkLst>
+          <pc:docMk/>
+          <pc:sldMk cId="1190154996" sldId="256"/>
+        </pc:sldMkLst>
+        <pc:spChg chg="mod ord">
+          <ac:chgData name="Tirthankar Barari (TR)" userId="e41d4ef3-c9c5-4f08-a494-4c3cb9d953aa" providerId="ADAL" clId="{079A74BE-26DC-4701-92BA-94758874B078}" dt="2024-10-01T13:24:16.086" v="32" actId="255"/>
+          <ac:spMkLst>
+            <pc:docMk/>
+            <pc:sldMk cId="1190154996" sldId="256"/>
+            <ac:spMk id="1165" creationId="{4894810F-1B48-3B30-EB4E-3C0C7C8A3595}"/>
+          </ac:spMkLst>
+        </pc:spChg>
+        <pc:picChg chg="del">
+          <ac:chgData name="Tirthankar Barari (TR)" userId="e41d4ef3-c9c5-4f08-a494-4c3cb9d953aa" providerId="ADAL" clId="{079A74BE-26DC-4701-92BA-94758874B078}" dt="2024-10-01T13:20:21.985" v="0" actId="478"/>
+          <ac:picMkLst>
+            <pc:docMk/>
+            <pc:sldMk cId="1190154996" sldId="256"/>
+            <ac:picMk id="3" creationId="{1B55070A-9316-B35D-111A-10D789C3DDC9}"/>
+          </ac:picMkLst>
+        </pc:picChg>
+        <pc:picChg chg="add mod ord">
+          <ac:chgData name="Tirthankar Barari (TR)" userId="e41d4ef3-c9c5-4f08-a494-4c3cb9d953aa" providerId="ADAL" clId="{079A74BE-26DC-4701-92BA-94758874B078}" dt="2024-10-01T13:24:25.950" v="33" actId="1076"/>
+          <ac:picMkLst>
+            <pc:docMk/>
+            <pc:sldMk cId="1190154996" sldId="256"/>
+            <ac:picMk id="4" creationId="{39A947D3-BF18-77AD-EFAB-EF3F4205BFC5}"/>
+          </ac:picMkLst>
+        </pc:picChg>
+      </pc:sldChg>
+    </pc:docChg>
+  </pc:docChgLst>
 </pc:chgInfo>
 </file>
 
@@ -243,7 +283,7 @@
           <a:p>
             <a:fld id="{2597F8CA-C0D6-46E1-BE92-BE44C33ECD60}" type="datetimeFigureOut">
               <a:rPr lang="en-US" smtClean="0"/>
-              <a:t>9/6/2024</a:t>
+              <a:t>9/27/2024</a:t>
             </a:fld>
             <a:endParaRPr lang="en-US"/>
           </a:p>
@@ -1132,7 +1172,7 @@
           <a:p>
             <a:fld id="{46A9F2F8-7B6D-46B7-8E68-D723B59E620F}" type="datetimeFigureOut">
               <a:rPr lang="en-US" smtClean="0"/>
-              <a:t>9/6/2024</a:t>
+              <a:t>9/27/2024</a:t>
             </a:fld>
             <a:endParaRPr lang="en-US"/>
           </a:p>
@@ -1330,7 +1370,7 @@
           <a:p>
             <a:fld id="{46A9F2F8-7B6D-46B7-8E68-D723B59E620F}" type="datetimeFigureOut">
               <a:rPr lang="en-US" smtClean="0"/>
-              <a:t>9/6/2024</a:t>
+              <a:t>9/27/2024</a:t>
             </a:fld>
             <a:endParaRPr lang="en-US"/>
           </a:p>
@@ -1538,7 +1578,7 @@
           <a:p>
             <a:fld id="{46A9F2F8-7B6D-46B7-8E68-D723B59E620F}" type="datetimeFigureOut">
               <a:rPr lang="en-US" smtClean="0"/>
-              <a:t>9/6/2024</a:t>
+              <a:t>9/27/2024</a:t>
             </a:fld>
             <a:endParaRPr lang="en-US"/>
           </a:p>
@@ -1736,7 +1776,7 @@
           <a:p>
             <a:fld id="{46A9F2F8-7B6D-46B7-8E68-D723B59E620F}" type="datetimeFigureOut">
               <a:rPr lang="en-US" smtClean="0"/>
-              <a:t>9/6/2024</a:t>
+              <a:t>9/27/2024</a:t>
             </a:fld>
             <a:endParaRPr lang="en-US"/>
           </a:p>
@@ -2011,7 +2051,7 @@
           <a:p>
             <a:fld id="{46A9F2F8-7B6D-46B7-8E68-D723B59E620F}" type="datetimeFigureOut">
               <a:rPr lang="en-US" smtClean="0"/>
-              <a:t>9/6/2024</a:t>
+              <a:t>9/27/2024</a:t>
             </a:fld>
             <a:endParaRPr lang="en-US"/>
           </a:p>
@@ -2276,7 +2316,7 @@
           <a:p>
             <a:fld id="{46A9F2F8-7B6D-46B7-8E68-D723B59E620F}" type="datetimeFigureOut">
               <a:rPr lang="en-US" smtClean="0"/>
-              <a:t>9/6/2024</a:t>
+              <a:t>9/27/2024</a:t>
             </a:fld>
             <a:endParaRPr lang="en-US"/>
           </a:p>
@@ -2688,7 +2728,7 @@
           <a:p>
             <a:fld id="{46A9F2F8-7B6D-46B7-8E68-D723B59E620F}" type="datetimeFigureOut">
               <a:rPr lang="en-US" smtClean="0"/>
-              <a:t>9/6/2024</a:t>
+              <a:t>9/27/2024</a:t>
             </a:fld>
             <a:endParaRPr lang="en-US"/>
           </a:p>
@@ -2829,7 +2869,7 @@
           <a:p>
             <a:fld id="{46A9F2F8-7B6D-46B7-8E68-D723B59E620F}" type="datetimeFigureOut">
               <a:rPr lang="en-US" smtClean="0"/>
-              <a:t>9/6/2024</a:t>
+              <a:t>9/27/2024</a:t>
             </a:fld>
             <a:endParaRPr lang="en-US"/>
           </a:p>
@@ -2942,7 +2982,7 @@
           <a:p>
             <a:fld id="{46A9F2F8-7B6D-46B7-8E68-D723B59E620F}" type="datetimeFigureOut">
               <a:rPr lang="en-US" smtClean="0"/>
-              <a:t>9/6/2024</a:t>
+              <a:t>9/27/2024</a:t>
             </a:fld>
             <a:endParaRPr lang="en-US"/>
           </a:p>
@@ -3253,7 +3293,7 @@
           <a:p>
             <a:fld id="{46A9F2F8-7B6D-46B7-8E68-D723B59E620F}" type="datetimeFigureOut">
               <a:rPr lang="en-US" smtClean="0"/>
-              <a:t>9/6/2024</a:t>
+              <a:t>9/27/2024</a:t>
             </a:fld>
             <a:endParaRPr lang="en-US"/>
           </a:p>
@@ -3541,7 +3581,7 @@
           <a:p>
             <a:fld id="{46A9F2F8-7B6D-46B7-8E68-D723B59E620F}" type="datetimeFigureOut">
               <a:rPr lang="en-US" smtClean="0"/>
-              <a:t>9/6/2024</a:t>
+              <a:t>9/27/2024</a:t>
             </a:fld>
             <a:endParaRPr lang="en-US"/>
           </a:p>
@@ -3782,7 +3822,7 @@
           <a:p>
             <a:fld id="{46A9F2F8-7B6D-46B7-8E68-D723B59E620F}" type="datetimeFigureOut">
               <a:rPr lang="en-US" smtClean="0"/>
-              <a:t>9/6/2024</a:t>
+              <a:t>9/27/2024</a:t>
             </a:fld>
             <a:endParaRPr lang="en-US"/>
           </a:p>
@@ -7957,10 +7997,10 @@
       </p:grpSpPr>
       <p:pic>
         <p:nvPicPr>
-          <p:cNvPr id="3" name="Picture 2">
-            <a:extLst>
-              <a:ext uri="{FF2B5EF4-FFF2-40B4-BE49-F238E27FC236}">
-                <a16:creationId xmlns:a16="http://schemas.microsoft.com/office/drawing/2014/main" id="{1B55070A-9316-B35D-111A-10D789C3DDC9}"/>
+          <p:cNvPr id="4" name="Picture 3">
+            <a:extLst>
+              <a:ext uri="{FF2B5EF4-FFF2-40B4-BE49-F238E27FC236}">
+                <a16:creationId xmlns:a16="http://schemas.microsoft.com/office/drawing/2014/main" id="{39A947D3-BF18-77AD-EFAB-EF3F4205BFC5}"/>
               </a:ext>
             </a:extLst>
           </p:cNvPr>
@@ -7977,8 +8017,8 @@
         </p:blipFill>
         <p:spPr>
           <a:xfrm>
-            <a:off x="1625840" y="651353"/>
-            <a:ext cx="10426657" cy="6077439"/>
+            <a:off x="1606263" y="321612"/>
+            <a:ext cx="9760059" cy="6214775"/>
           </a:xfrm>
           <a:prstGeom prst="rect">
             <a:avLst/>
@@ -7999,8 +8039,8 @@
         </p:nvSpPr>
         <p:spPr>
           <a:xfrm>
-            <a:off x="609599" y="315913"/>
-            <a:ext cx="3276601" cy="584775"/>
+            <a:off x="243469" y="565166"/>
+            <a:ext cx="3068444" cy="553998"/>
           </a:xfrm>
           <a:prstGeom prst="rect">
             <a:avLst/>
@@ -8013,8 +8053,9 @@
           </a:bodyPr>
           <a:lstStyle/>
           <a:p>
-            <a:r>
-              <a:rPr lang="en-US" sz="3200" dirty="0"/>
+            <a:pPr algn="ctr"/>
+            <a:r>
+              <a:rPr lang="en-US" sz="3000" dirty="0"/>
               <a:t>The Architecture</a:t>
             </a:r>
           </a:p>

</xml_diff>